<commit_message>
Adding pdf, clarifai and twilio sdk demo
</commit_message>
<xml_diff>
--- a/presentation/Intro-to-APIs.pptx
+++ b/presentation/Intro-to-APIs.pptx
@@ -294,7 +294,7 @@
           <a:p>
             <a:fld id="{69D7F17B-0ECD-554D-8A5B-D311C4D74A42}" type="datetimeFigureOut">
               <a:rPr lang="en-US" smtClean="0"/>
-              <a:t>2/22/16</a:t>
+              <a:t>2/25/16</a:t>
             </a:fld>
             <a:endParaRPr lang="en-US"/>
           </a:p>
@@ -464,7 +464,7 @@
           <a:p>
             <a:fld id="{69D7F17B-0ECD-554D-8A5B-D311C4D74A42}" type="datetimeFigureOut">
               <a:rPr lang="en-US" smtClean="0"/>
-              <a:t>2/22/16</a:t>
+              <a:t>2/25/16</a:t>
             </a:fld>
             <a:endParaRPr lang="en-US"/>
           </a:p>
@@ -644,7 +644,7 @@
           <a:p>
             <a:fld id="{69D7F17B-0ECD-554D-8A5B-D311C4D74A42}" type="datetimeFigureOut">
               <a:rPr lang="en-US" smtClean="0"/>
-              <a:t>2/22/16</a:t>
+              <a:t>2/25/16</a:t>
             </a:fld>
             <a:endParaRPr lang="en-US"/>
           </a:p>
@@ -814,7 +814,7 @@
           <a:p>
             <a:fld id="{69D7F17B-0ECD-554D-8A5B-D311C4D74A42}" type="datetimeFigureOut">
               <a:rPr lang="en-US" smtClean="0"/>
-              <a:t>2/22/16</a:t>
+              <a:t>2/25/16</a:t>
             </a:fld>
             <a:endParaRPr lang="en-US"/>
           </a:p>
@@ -1060,7 +1060,7 @@
           <a:p>
             <a:fld id="{69D7F17B-0ECD-554D-8A5B-D311C4D74A42}" type="datetimeFigureOut">
               <a:rPr lang="en-US" smtClean="0"/>
-              <a:t>2/22/16</a:t>
+              <a:t>2/25/16</a:t>
             </a:fld>
             <a:endParaRPr lang="en-US"/>
           </a:p>
@@ -1348,7 +1348,7 @@
           <a:p>
             <a:fld id="{69D7F17B-0ECD-554D-8A5B-D311C4D74A42}" type="datetimeFigureOut">
               <a:rPr lang="en-US" smtClean="0"/>
-              <a:t>2/22/16</a:t>
+              <a:t>2/25/16</a:t>
             </a:fld>
             <a:endParaRPr lang="en-US"/>
           </a:p>
@@ -1770,7 +1770,7 @@
           <a:p>
             <a:fld id="{69D7F17B-0ECD-554D-8A5B-D311C4D74A42}" type="datetimeFigureOut">
               <a:rPr lang="en-US" smtClean="0"/>
-              <a:t>2/22/16</a:t>
+              <a:t>2/25/16</a:t>
             </a:fld>
             <a:endParaRPr lang="en-US"/>
           </a:p>
@@ -1888,7 +1888,7 @@
           <a:p>
             <a:fld id="{69D7F17B-0ECD-554D-8A5B-D311C4D74A42}" type="datetimeFigureOut">
               <a:rPr lang="en-US" smtClean="0"/>
-              <a:t>2/22/16</a:t>
+              <a:t>2/25/16</a:t>
             </a:fld>
             <a:endParaRPr lang="en-US"/>
           </a:p>
@@ -1983,7 +1983,7 @@
           <a:p>
             <a:fld id="{69D7F17B-0ECD-554D-8A5B-D311C4D74A42}" type="datetimeFigureOut">
               <a:rPr lang="en-US" smtClean="0"/>
-              <a:t>2/22/16</a:t>
+              <a:t>2/25/16</a:t>
             </a:fld>
             <a:endParaRPr lang="en-US"/>
           </a:p>
@@ -2260,7 +2260,7 @@
           <a:p>
             <a:fld id="{69D7F17B-0ECD-554D-8A5B-D311C4D74A42}" type="datetimeFigureOut">
               <a:rPr lang="en-US" smtClean="0"/>
-              <a:t>2/22/16</a:t>
+              <a:t>2/25/16</a:t>
             </a:fld>
             <a:endParaRPr lang="en-US"/>
           </a:p>
@@ -2517,7 +2517,7 @@
           <a:p>
             <a:fld id="{69D7F17B-0ECD-554D-8A5B-D311C4D74A42}" type="datetimeFigureOut">
               <a:rPr lang="en-US" smtClean="0"/>
-              <a:t>2/22/16</a:t>
+              <a:t>2/25/16</a:t>
             </a:fld>
             <a:endParaRPr lang="en-US"/>
           </a:p>
@@ -2730,7 +2730,7 @@
           <a:p>
             <a:fld id="{69D7F17B-0ECD-554D-8A5B-D311C4D74A42}" type="datetimeFigureOut">
               <a:rPr lang="en-US" smtClean="0"/>
-              <a:t>2/22/16</a:t>
+              <a:t>2/25/16</a:t>
             </a:fld>
             <a:endParaRPr lang="en-US"/>
           </a:p>
@@ -3754,6 +3754,29 @@
           </a:p>
         </p:txBody>
       </p:sp>
+      <p:pic>
+        <p:nvPicPr>
+          <p:cNvPr id="4" name="Picture 3"/>
+          <p:cNvPicPr>
+            <a:picLocks noChangeAspect="1"/>
+          </p:cNvPicPr>
+          <p:nvPr/>
+        </p:nvPicPr>
+        <p:blipFill rotWithShape="1">
+          <a:blip r:embed="rId2"/>
+          <a:srcRect r="59844" b="78876"/>
+          <a:stretch/>
+        </p:blipFill>
+        <p:spPr>
+          <a:xfrm>
+            <a:off x="1926351" y="3934978"/>
+            <a:ext cx="5225550" cy="2221240"/>
+          </a:xfrm>
+          <a:prstGeom prst="rect">
+            <a:avLst/>
+          </a:prstGeom>
+        </p:spPr>
+      </p:pic>
     </p:spTree>
     <p:extLst>
       <p:ext uri="{BB962C8B-B14F-4D97-AF65-F5344CB8AC3E}">
@@ -3994,7 +4017,7 @@
         </p:blipFill>
         <p:spPr>
           <a:xfrm>
-            <a:off x="1459470" y="2861067"/>
+            <a:off x="1459470" y="3254135"/>
             <a:ext cx="482600" cy="482600"/>
           </a:xfrm>
           <a:prstGeom prst="rect">
@@ -4018,7 +4041,7 @@
         </p:blipFill>
         <p:spPr>
           <a:xfrm>
-            <a:off x="5486422" y="2861067"/>
+            <a:off x="5486422" y="3254135"/>
             <a:ext cx="215900" cy="482600"/>
           </a:xfrm>
           <a:prstGeom prst="rect">
@@ -4042,7 +4065,7 @@
         </p:blipFill>
         <p:spPr>
           <a:xfrm>
-            <a:off x="3415796" y="2861067"/>
+            <a:off x="3415796" y="3254135"/>
             <a:ext cx="596900" cy="482600"/>
           </a:xfrm>
           <a:prstGeom prst="rect">
@@ -4066,7 +4089,7 @@
         </p:blipFill>
         <p:spPr>
           <a:xfrm>
-            <a:off x="7176047" y="2745617"/>
+            <a:off x="7176047" y="3138685"/>
             <a:ext cx="717858" cy="717858"/>
           </a:xfrm>
           <a:prstGeom prst="rect">

</xml_diff>